<commit_message>
Added Readme for timing; updated Presentation
</commit_message>
<xml_diff>
--- a/BA_eval_TF.pptx
+++ b/BA_eval_TF.pptx
@@ -234,7 +234,7 @@
           <a:p>
             <a:fld id="{4FDFBDF7-B02B-4104-9EAF-C460D59CA111}" type="datetimeFigureOut">
               <a:rPr lang="de-DE" smtClean="0"/>
-              <a:t>12.07.2025</a:t>
+              <a:t>13.07.2025</a:t>
             </a:fld>
             <a:endParaRPr lang="de-DE"/>
           </a:p>
@@ -10820,6 +10820,41 @@
           </a:p>
         </p:txBody>
       </p:sp>
+      <p:sp>
+        <p:nvSpPr>
+          <p:cNvPr id="5" name="Textfeld 4">
+            <a:extLst>
+              <a:ext uri="{FF2B5EF4-FFF2-40B4-BE49-F238E27FC236}">
+                <a16:creationId xmlns:a16="http://schemas.microsoft.com/office/drawing/2014/main" id="{91F7ED37-C467-41F5-D96A-C0C1EEDC85F0}"/>
+              </a:ext>
+            </a:extLst>
+          </p:cNvPr>
+          <p:cNvSpPr txBox="1"/>
+          <p:nvPr/>
+        </p:nvSpPr>
+        <p:spPr>
+          <a:xfrm>
+            <a:off x="575734" y="4987249"/>
+            <a:ext cx="4727576" cy="369332"/>
+          </a:xfrm>
+          <a:prstGeom prst="rect">
+            <a:avLst/>
+          </a:prstGeom>
+          <a:noFill/>
+        </p:spPr>
+        <p:txBody>
+          <a:bodyPr wrap="none" rtlCol="0">
+            <a:spAutoFit/>
+          </a:bodyPr>
+          <a:lstStyle/>
+          <a:p>
+            <a:r>
+              <a:rPr lang="de-DE" dirty="0"/>
+              <a:t>1DC bei tiefer Struktur: 1007s | 185s | 1507s</a:t>
+            </a:r>
+          </a:p>
+        </p:txBody>
+      </p:sp>
     </p:spTree>
     <p:extLst>
       <p:ext uri="{BB962C8B-B14F-4D97-AF65-F5344CB8AC3E}">
@@ -10851,7 +10886,7 @@
                             </p:stCondLst>
                             <p:childTnLst>
                               <p:par>
-                                <p:cTn id="5" presetID="1" presetClass="exit" presetSubtype="0" fill="hold" grpId="0" nodeType="clickEffect">
+                                <p:cTn id="5" presetID="1" presetClass="entr" presetSubtype="0" fill="hold" grpId="0" nodeType="clickEffect">
                                   <p:stCondLst>
                                     <p:cond delay="0"/>
                                   </p:stCondLst>
@@ -10859,6 +10894,51 @@
                                     <p:set>
                                       <p:cBhvr>
                                         <p:cTn id="6" dur="1" fill="hold">
+                                          <p:stCondLst>
+                                            <p:cond delay="0"/>
+                                          </p:stCondLst>
+                                        </p:cTn>
+                                        <p:tgtEl>
+                                          <p:spTgt spid="5"/>
+                                        </p:tgtEl>
+                                        <p:attrNameLst>
+                                          <p:attrName>style.visibility</p:attrName>
+                                        </p:attrNameLst>
+                                      </p:cBhvr>
+                                      <p:to>
+                                        <p:strVal val="visible"/>
+                                      </p:to>
+                                    </p:set>
+                                  </p:childTnLst>
+                                </p:cTn>
+                              </p:par>
+                            </p:childTnLst>
+                          </p:cTn>
+                        </p:par>
+                      </p:childTnLst>
+                    </p:cTn>
+                  </p:par>
+                  <p:par>
+                    <p:cTn id="7" fill="hold">
+                      <p:stCondLst>
+                        <p:cond delay="indefinite"/>
+                      </p:stCondLst>
+                      <p:childTnLst>
+                        <p:par>
+                          <p:cTn id="8" fill="hold">
+                            <p:stCondLst>
+                              <p:cond delay="0"/>
+                            </p:stCondLst>
+                            <p:childTnLst>
+                              <p:par>
+                                <p:cTn id="9" presetID="1" presetClass="exit" presetSubtype="0" fill="hold" grpId="0" nodeType="clickEffect">
+                                  <p:stCondLst>
+                                    <p:cond delay="0"/>
+                                  </p:stCondLst>
+                                  <p:childTnLst>
+                                    <p:set>
+                                      <p:cBhvr>
+                                        <p:cTn id="10" dur="1" fill="hold">
                                           <p:stCondLst>
                                             <p:cond delay="0"/>
                                           </p:stCondLst>
@@ -10878,14 +10958,14 @@
                                 </p:cTn>
                               </p:par>
                               <p:par>
-                                <p:cTn id="7" presetID="1" presetClass="exit" presetSubtype="0" fill="hold" grpId="0" nodeType="withEffect">
+                                <p:cTn id="11" presetID="1" presetClass="exit" presetSubtype="0" fill="hold" grpId="0" nodeType="withEffect">
                                   <p:stCondLst>
                                     <p:cond delay="0"/>
                                   </p:stCondLst>
                                   <p:childTnLst>
                                     <p:set>
                                       <p:cBhvr>
-                                        <p:cTn id="8" dur="1" fill="hold">
+                                        <p:cTn id="12" dur="1" fill="hold">
                                           <p:stCondLst>
                                             <p:cond delay="0"/>
                                           </p:stCondLst>
@@ -10934,6 +11014,7 @@
     <p:bldLst>
       <p:bldP spid="3" grpId="0" animBg="1"/>
       <p:bldP spid="4" grpId="0" animBg="1"/>
+      <p:bldP spid="5" grpId="0"/>
     </p:bldLst>
   </p:timing>
 </p:sld>
@@ -11346,7 +11427,7 @@
         <p:spPr>
           <a:xfrm>
             <a:off x="369856" y="3518908"/>
-            <a:ext cx="5942652" cy="369332"/>
+            <a:ext cx="7532831" cy="369332"/>
           </a:xfrm>
           <a:prstGeom prst="rect">
             <a:avLst/>
@@ -11361,7 +11442,7 @@
           <a:p>
             <a:r>
               <a:rPr lang="de-DE" dirty="0"/>
-              <a:t>Bei mehr Daten und mehr Epochen ändert sich das Bild.</a:t>
+              <a:t>Bei mehr Daten, Epochen und tieferen Netzen ist mit Cascade schneller</a:t>
             </a:r>
           </a:p>
         </p:txBody>
@@ -11519,8 +11600,8 @@
         </p:nvSpPr>
         <p:spPr>
           <a:xfrm>
-            <a:off x="340674" y="2595803"/>
-            <a:ext cx="6157404" cy="1354586"/>
+            <a:off x="340673" y="2595803"/>
+            <a:ext cx="7508827" cy="1354586"/>
           </a:xfrm>
           <a:prstGeom prst="rect">
             <a:avLst/>

</xml_diff>